<commit_message>
Fix figures in Sections 10 through 17
</commit_message>
<xml_diff>
--- a/ITI/TF/Volume1/media/Figure_10.1-1b.pptx
+++ b/ITI/TF/Volume1/media/Figure_10.1-1b.pptx
@@ -104,6 +104,11 @@
       </a:defRPr>
     </a:lvl9pPr>
   </p:defaultTextStyle>
+  <p:extLst>
+    <p:ext uri="{EFAFB233-063F-42B5-8137-9DF3F51BA10A}">
+      <p15:sldGuideLst xmlns:p15="http://schemas.microsoft.com/office/powerpoint/2012/main"/>
+    </p:ext>
+  </p:extLst>
 </p:presentation>
 </file>
 
@@ -254,7 +259,7 @@
           <a:p>
             <a:fld id="{63EF325A-FC78-D44F-9B1F-D740736EFC82}" type="datetimeFigureOut">
               <a:rPr lang="en-US" smtClean="0"/>
-              <a:t>8/10/20</a:t>
+              <a:t>8/26/20</a:t>
             </a:fld>
             <a:endParaRPr lang="en-US"/>
           </a:p>
@@ -452,7 +457,7 @@
           <a:p>
             <a:fld id="{63EF325A-FC78-D44F-9B1F-D740736EFC82}" type="datetimeFigureOut">
               <a:rPr lang="en-US" smtClean="0"/>
-              <a:t>8/10/20</a:t>
+              <a:t>8/26/20</a:t>
             </a:fld>
             <a:endParaRPr lang="en-US"/>
           </a:p>
@@ -660,7 +665,7 @@
           <a:p>
             <a:fld id="{63EF325A-FC78-D44F-9B1F-D740736EFC82}" type="datetimeFigureOut">
               <a:rPr lang="en-US" smtClean="0"/>
-              <a:t>8/10/20</a:t>
+              <a:t>8/26/20</a:t>
             </a:fld>
             <a:endParaRPr lang="en-US"/>
           </a:p>
@@ -858,7 +863,7 @@
           <a:p>
             <a:fld id="{63EF325A-FC78-D44F-9B1F-D740736EFC82}" type="datetimeFigureOut">
               <a:rPr lang="en-US" smtClean="0"/>
-              <a:t>8/10/20</a:t>
+              <a:t>8/26/20</a:t>
             </a:fld>
             <a:endParaRPr lang="en-US"/>
           </a:p>
@@ -1133,7 +1138,7 @@
           <a:p>
             <a:fld id="{63EF325A-FC78-D44F-9B1F-D740736EFC82}" type="datetimeFigureOut">
               <a:rPr lang="en-US" smtClean="0"/>
-              <a:t>8/10/20</a:t>
+              <a:t>8/26/20</a:t>
             </a:fld>
             <a:endParaRPr lang="en-US"/>
           </a:p>
@@ -1398,7 +1403,7 @@
           <a:p>
             <a:fld id="{63EF325A-FC78-D44F-9B1F-D740736EFC82}" type="datetimeFigureOut">
               <a:rPr lang="en-US" smtClean="0"/>
-              <a:t>8/10/20</a:t>
+              <a:t>8/26/20</a:t>
             </a:fld>
             <a:endParaRPr lang="en-US"/>
           </a:p>
@@ -1810,7 +1815,7 @@
           <a:p>
             <a:fld id="{63EF325A-FC78-D44F-9B1F-D740736EFC82}" type="datetimeFigureOut">
               <a:rPr lang="en-US" smtClean="0"/>
-              <a:t>8/10/20</a:t>
+              <a:t>8/26/20</a:t>
             </a:fld>
             <a:endParaRPr lang="en-US"/>
           </a:p>
@@ -1951,7 +1956,7 @@
           <a:p>
             <a:fld id="{63EF325A-FC78-D44F-9B1F-D740736EFC82}" type="datetimeFigureOut">
               <a:rPr lang="en-US" smtClean="0"/>
-              <a:t>8/10/20</a:t>
+              <a:t>8/26/20</a:t>
             </a:fld>
             <a:endParaRPr lang="en-US"/>
           </a:p>
@@ -2064,7 +2069,7 @@
           <a:p>
             <a:fld id="{63EF325A-FC78-D44F-9B1F-D740736EFC82}" type="datetimeFigureOut">
               <a:rPr lang="en-US" smtClean="0"/>
-              <a:t>8/10/20</a:t>
+              <a:t>8/26/20</a:t>
             </a:fld>
             <a:endParaRPr lang="en-US"/>
           </a:p>
@@ -2375,7 +2380,7 @@
           <a:p>
             <a:fld id="{63EF325A-FC78-D44F-9B1F-D740736EFC82}" type="datetimeFigureOut">
               <a:rPr lang="en-US" smtClean="0"/>
-              <a:t>8/10/20</a:t>
+              <a:t>8/26/20</a:t>
             </a:fld>
             <a:endParaRPr lang="en-US"/>
           </a:p>
@@ -2663,7 +2668,7 @@
           <a:p>
             <a:fld id="{63EF325A-FC78-D44F-9B1F-D740736EFC82}" type="datetimeFigureOut">
               <a:rPr lang="en-US" smtClean="0"/>
-              <a:t>8/10/20</a:t>
+              <a:t>8/26/20</a:t>
             </a:fld>
             <a:endParaRPr lang="en-US"/>
           </a:p>
@@ -2904,7 +2909,7 @@
           <a:p>
             <a:fld id="{63EF325A-FC78-D44F-9B1F-D740736EFC82}" type="datetimeFigureOut">
               <a:rPr lang="en-US" smtClean="0"/>
-              <a:t>8/10/20</a:t>
+              <a:t>8/26/20</a:t>
             </a:fld>
             <a:endParaRPr lang="en-US"/>
           </a:p>
@@ -3323,52 +3328,6 @@
       </p:grpSpPr>
       <p:sp>
         <p:nvSpPr>
-          <p:cNvPr id="4" name="Rectangle 34">
-            <a:extLst>
-              <a:ext uri="{FF2B5EF4-FFF2-40B4-BE49-F238E27FC236}">
-                <a16:creationId xmlns:a16="http://schemas.microsoft.com/office/drawing/2014/main" id="{78E07E07-497C-4C44-926D-FE65ADD6AFD7}"/>
-              </a:ext>
-            </a:extLst>
-          </p:cNvPr>
-          <p:cNvSpPr>
-            <a:spLocks noChangeArrowheads="1"/>
-          </p:cNvSpPr>
-          <p:nvPr/>
-        </p:nvSpPr>
-        <p:spPr bwMode="auto">
-          <a:xfrm>
-            <a:off x="25400" y="457200"/>
-            <a:ext cx="8229600" cy="4813300"/>
-          </a:xfrm>
-          <a:prstGeom prst="rect">
-            <a:avLst/>
-          </a:prstGeom>
-          <a:solidFill>
-            <a:srgbClr val="FFFFFF"/>
-          </a:solidFill>
-          <a:ln w="38100">
-            <a:solidFill>
-              <a:srgbClr val="000000"/>
-            </a:solidFill>
-            <a:miter lim="800000"/>
-            <a:headEnd/>
-            <a:tailEnd/>
-          </a:ln>
-        </p:spPr>
-        <p:txBody>
-          <a:bodyPr vert="horz" wrap="square" lIns="91440" tIns="45720" rIns="91440" bIns="45720" numCol="1" anchor="t" anchorCtr="0" compatLnSpc="1">
-            <a:prstTxWarp prst="textNoShape">
-              <a:avLst/>
-            </a:prstTxWarp>
-          </a:bodyPr>
-          <a:lstStyle/>
-          <a:p>
-            <a:endParaRPr lang="en-US"/>
-          </a:p>
-        </p:txBody>
-      </p:sp>
-      <p:sp>
-        <p:nvSpPr>
           <p:cNvPr id="5" name="Rectangle 33">
             <a:extLst>
               <a:ext uri="{FF2B5EF4-FFF2-40B4-BE49-F238E27FC236}">
@@ -3410,7 +3369,10 @@
           </a:bodyPr>
           <a:lstStyle/>
           <a:p>
-            <a:endParaRPr lang="en-US"/>
+            <a:endParaRPr lang="en-US">
+              <a:latin typeface="Times New Roman" panose="02020603050405020304" pitchFamily="18" charset="0"/>
+              <a:cs typeface="Times New Roman" panose="02020603050405020304" pitchFamily="18" charset="0"/>
+            </a:endParaRPr>
           </a:p>
         </p:txBody>
       </p:sp>
@@ -3456,7 +3418,10 @@
           </a:bodyPr>
           <a:lstStyle/>
           <a:p>
-            <a:endParaRPr lang="en-US"/>
+            <a:endParaRPr lang="en-US">
+              <a:latin typeface="Times New Roman" panose="02020603050405020304" pitchFamily="18" charset="0"/>
+              <a:cs typeface="Times New Roman" panose="02020603050405020304" pitchFamily="18" charset="0"/>
+            </a:endParaRPr>
           </a:p>
         </p:txBody>
       </p:sp>
@@ -3539,8 +3504,9 @@
                   <a:schemeClr val="tx1"/>
                 </a:solidFill>
                 <a:effectLst/>
-                <a:latin typeface="Arial" panose="020B0604020202020204" pitchFamily="34" charset="0"/>
+                <a:latin typeface="Times New Roman" panose="02020603050405020304" pitchFamily="18" charset="0"/>
                 <a:ea typeface="Times New Roman" panose="02020603050405020304" pitchFamily="18" charset="0"/>
+                <a:cs typeface="Times New Roman" panose="02020603050405020304" pitchFamily="18" charset="0"/>
               </a:rPr>
             </a:br>
             <a:r>
@@ -3552,8 +3518,9 @@
                   <a:schemeClr val="tx1"/>
                 </a:solidFill>
                 <a:effectLst/>
-                <a:latin typeface="Arial" panose="020B0604020202020204" pitchFamily="34" charset="0"/>
+                <a:latin typeface="Times New Roman" panose="02020603050405020304" pitchFamily="18" charset="0"/>
                 <a:ea typeface="Times New Roman" panose="02020603050405020304" pitchFamily="18" charset="0"/>
+                <a:cs typeface="Times New Roman" panose="02020603050405020304" pitchFamily="18" charset="0"/>
               </a:rPr>
               <a:t>Document Source</a:t>
             </a:r>
@@ -3565,7 +3532,8 @@
                 <a:schemeClr val="tx1"/>
               </a:solidFill>
               <a:effectLst/>
-              <a:latin typeface="Arial" panose="020B0604020202020204" pitchFamily="34" charset="0"/>
+              <a:latin typeface="Times New Roman" panose="02020603050405020304" pitchFamily="18" charset="0"/>
+              <a:cs typeface="Times New Roman" panose="02020603050405020304" pitchFamily="18" charset="0"/>
             </a:endParaRPr>
           </a:p>
         </p:txBody>
@@ -3612,7 +3580,10 @@
           </a:bodyPr>
           <a:lstStyle/>
           <a:p>
-            <a:endParaRPr lang="en-US"/>
+            <a:endParaRPr lang="en-US">
+              <a:latin typeface="Times New Roman" panose="02020603050405020304" pitchFamily="18" charset="0"/>
+              <a:cs typeface="Times New Roman" panose="02020603050405020304" pitchFamily="18" charset="0"/>
+            </a:endParaRPr>
           </a:p>
         </p:txBody>
       </p:sp>
@@ -3695,8 +3666,9 @@
                   <a:schemeClr val="tx1"/>
                 </a:solidFill>
                 <a:effectLst/>
-                <a:latin typeface="Arial" panose="020B0604020202020204" pitchFamily="34" charset="0"/>
+                <a:latin typeface="Times New Roman" panose="02020603050405020304" pitchFamily="18" charset="0"/>
                 <a:ea typeface="Times New Roman" panose="02020603050405020304" pitchFamily="18" charset="0"/>
+                <a:cs typeface="Times New Roman" panose="02020603050405020304" pitchFamily="18" charset="0"/>
               </a:rPr>
             </a:br>
             <a:r>
@@ -3708,8 +3680,9 @@
                   <a:schemeClr val="tx1"/>
                 </a:solidFill>
                 <a:effectLst/>
-                <a:latin typeface="Arial" panose="020B0604020202020204" pitchFamily="34" charset="0"/>
+                <a:latin typeface="Times New Roman" panose="02020603050405020304" pitchFamily="18" charset="0"/>
                 <a:ea typeface="Times New Roman" panose="02020603050405020304" pitchFamily="18" charset="0"/>
+                <a:cs typeface="Times New Roman" panose="02020603050405020304" pitchFamily="18" charset="0"/>
               </a:rPr>
               <a:t>Document Consumer</a:t>
             </a:r>
@@ -3721,7 +3694,8 @@
                 <a:schemeClr val="tx1"/>
               </a:solidFill>
               <a:effectLst/>
-              <a:latin typeface="Arial" panose="020B0604020202020204" pitchFamily="34" charset="0"/>
+              <a:latin typeface="Times New Roman" panose="02020603050405020304" pitchFamily="18" charset="0"/>
+              <a:cs typeface="Times New Roman" panose="02020603050405020304" pitchFamily="18" charset="0"/>
             </a:endParaRPr>
           </a:p>
         </p:txBody>
@@ -3768,7 +3742,10 @@
           </a:bodyPr>
           <a:lstStyle/>
           <a:p>
-            <a:endParaRPr lang="en-US"/>
+            <a:endParaRPr lang="en-US">
+              <a:latin typeface="Times New Roman" panose="02020603050405020304" pitchFamily="18" charset="0"/>
+              <a:cs typeface="Times New Roman" panose="02020603050405020304" pitchFamily="18" charset="0"/>
+            </a:endParaRPr>
           </a:p>
         </p:txBody>
       </p:sp>
@@ -3851,8 +3828,9 @@
                   <a:schemeClr val="tx1"/>
                 </a:solidFill>
                 <a:effectLst/>
-                <a:latin typeface="Arial" panose="020B0604020202020204" pitchFamily="34" charset="0"/>
+                <a:latin typeface="Times New Roman" panose="02020603050405020304" pitchFamily="18" charset="0"/>
                 <a:ea typeface="Times New Roman" panose="02020603050405020304" pitchFamily="18" charset="0"/>
+                <a:cs typeface="Times New Roman" panose="02020603050405020304" pitchFamily="18" charset="0"/>
               </a:rPr>
             </a:br>
             <a:r>
@@ -3864,8 +3842,9 @@
                   <a:schemeClr val="tx1"/>
                 </a:solidFill>
                 <a:effectLst/>
-                <a:latin typeface="Arial" panose="020B0604020202020204" pitchFamily="34" charset="0"/>
+                <a:latin typeface="Times New Roman" panose="02020603050405020304" pitchFamily="18" charset="0"/>
                 <a:ea typeface="Times New Roman" panose="02020603050405020304" pitchFamily="18" charset="0"/>
+                <a:cs typeface="Times New Roman" panose="02020603050405020304" pitchFamily="18" charset="0"/>
               </a:rPr>
               <a:t>Document Registry </a:t>
             </a:r>
@@ -3877,7 +3856,8 @@
                 <a:schemeClr val="tx1"/>
               </a:solidFill>
               <a:effectLst/>
-              <a:latin typeface="Arial" panose="020B0604020202020204" pitchFamily="34" charset="0"/>
+              <a:latin typeface="Times New Roman" panose="02020603050405020304" pitchFamily="18" charset="0"/>
+              <a:cs typeface="Times New Roman" panose="02020603050405020304" pitchFamily="18" charset="0"/>
             </a:endParaRPr>
           </a:p>
         </p:txBody>
@@ -3924,7 +3904,10 @@
           </a:bodyPr>
           <a:lstStyle/>
           <a:p>
-            <a:endParaRPr lang="en-US"/>
+            <a:endParaRPr lang="en-US">
+              <a:latin typeface="Times New Roman" panose="02020603050405020304" pitchFamily="18" charset="0"/>
+              <a:cs typeface="Times New Roman" panose="02020603050405020304" pitchFamily="18" charset="0"/>
+            </a:endParaRPr>
           </a:p>
         </p:txBody>
       </p:sp>
@@ -4007,8 +3990,9 @@
                   <a:schemeClr val="tx1"/>
                 </a:solidFill>
                 <a:effectLst/>
-                <a:latin typeface="Arial" panose="020B0604020202020204" pitchFamily="34" charset="0"/>
+                <a:latin typeface="Times New Roman" panose="02020603050405020304" pitchFamily="18" charset="0"/>
                 <a:ea typeface="Times New Roman" panose="02020603050405020304" pitchFamily="18" charset="0"/>
+                <a:cs typeface="Times New Roman" panose="02020603050405020304" pitchFamily="18" charset="0"/>
               </a:rPr>
               <a:t>Document Repository</a:t>
             </a:r>
@@ -4021,8 +4005,9 @@
                   <a:schemeClr val="tx1"/>
                 </a:solidFill>
                 <a:effectLst/>
-                <a:latin typeface="Arial" panose="020B0604020202020204" pitchFamily="34" charset="0"/>
+                <a:latin typeface="Times New Roman" panose="02020603050405020304" pitchFamily="18" charset="0"/>
                 <a:ea typeface="Times New Roman" panose="02020603050405020304" pitchFamily="18" charset="0"/>
+                <a:cs typeface="Times New Roman" panose="02020603050405020304" pitchFamily="18" charset="0"/>
               </a:rPr>
             </a:br>
             <a:br>
@@ -4034,8 +4019,9 @@
                   <a:schemeClr val="tx1"/>
                 </a:solidFill>
                 <a:effectLst/>
-                <a:latin typeface="Arial" panose="020B0604020202020204" pitchFamily="34" charset="0"/>
+                <a:latin typeface="Times New Roman" panose="02020603050405020304" pitchFamily="18" charset="0"/>
                 <a:ea typeface="Times New Roman" panose="02020603050405020304" pitchFamily="18" charset="0"/>
+                <a:cs typeface="Times New Roman" panose="02020603050405020304" pitchFamily="18" charset="0"/>
               </a:rPr>
             </a:br>
             <a:endParaRPr kumimoji="0" lang="fr-FR" altLang="en-US" sz="1800" b="0" i="0" u="none" strike="noStrike" cap="none" normalizeH="0" baseline="0">
@@ -4046,7 +4032,8 @@
                 <a:schemeClr val="tx1"/>
               </a:solidFill>
               <a:effectLst/>
-              <a:latin typeface="Arial" panose="020B0604020202020204" pitchFamily="34" charset="0"/>
+              <a:latin typeface="Times New Roman" panose="02020603050405020304" pitchFamily="18" charset="0"/>
+              <a:cs typeface="Times New Roman" panose="02020603050405020304" pitchFamily="18" charset="0"/>
             </a:endParaRPr>
           </a:p>
         </p:txBody>
@@ -4098,7 +4085,10 @@
           </a:bodyPr>
           <a:lstStyle/>
           <a:p>
-            <a:endParaRPr lang="en-US"/>
+            <a:endParaRPr lang="en-US">
+              <a:latin typeface="Times New Roman" panose="02020603050405020304" pitchFamily="18" charset="0"/>
+              <a:cs typeface="Times New Roman" panose="02020603050405020304" pitchFamily="18" charset="0"/>
+            </a:endParaRPr>
           </a:p>
         </p:txBody>
       </p:sp>
@@ -4149,7 +4139,10 @@
           </a:bodyPr>
           <a:lstStyle/>
           <a:p>
-            <a:endParaRPr lang="en-US"/>
+            <a:endParaRPr lang="en-US">
+              <a:latin typeface="Times New Roman" panose="02020603050405020304" pitchFamily="18" charset="0"/>
+              <a:cs typeface="Times New Roman" panose="02020603050405020304" pitchFamily="18" charset="0"/>
+            </a:endParaRPr>
           </a:p>
         </p:txBody>
       </p:sp>
@@ -4200,7 +4193,10 @@
           </a:bodyPr>
           <a:lstStyle/>
           <a:p>
-            <a:endParaRPr lang="en-US"/>
+            <a:endParaRPr lang="en-US">
+              <a:latin typeface="Times New Roman" panose="02020603050405020304" pitchFamily="18" charset="0"/>
+              <a:cs typeface="Times New Roman" panose="02020603050405020304" pitchFamily="18" charset="0"/>
+            </a:endParaRPr>
           </a:p>
         </p:txBody>
       </p:sp>
@@ -4251,7 +4247,10 @@
           </a:bodyPr>
           <a:lstStyle/>
           <a:p>
-            <a:endParaRPr lang="en-US"/>
+            <a:endParaRPr lang="en-US">
+              <a:latin typeface="Times New Roman" panose="02020603050405020304" pitchFamily="18" charset="0"/>
+              <a:cs typeface="Times New Roman" panose="02020603050405020304" pitchFamily="18" charset="0"/>
+            </a:endParaRPr>
           </a:p>
         </p:txBody>
       </p:sp>
@@ -4360,7 +4359,10 @@
           </a:bodyPr>
           <a:lstStyle/>
           <a:p>
-            <a:endParaRPr lang="en-US"/>
+            <a:endParaRPr lang="en-US">
+              <a:latin typeface="Times New Roman" panose="02020603050405020304" pitchFamily="18" charset="0"/>
+              <a:cs typeface="Times New Roman" panose="02020603050405020304" pitchFamily="18" charset="0"/>
+            </a:endParaRPr>
           </a:p>
         </p:txBody>
       </p:sp>
@@ -4443,8 +4445,9 @@
                   <a:schemeClr val="tx1"/>
                 </a:solidFill>
                 <a:effectLst/>
-                <a:latin typeface="Arial" panose="020B0604020202020204" pitchFamily="34" charset="0"/>
+                <a:latin typeface="Times New Roman" panose="02020603050405020304" pitchFamily="18" charset="0"/>
                 <a:ea typeface="Times New Roman" panose="02020603050405020304" pitchFamily="18" charset="0"/>
+                <a:cs typeface="Times New Roman" panose="02020603050405020304" pitchFamily="18" charset="0"/>
               </a:rPr>
             </a:br>
             <a:r>
@@ -4456,8 +4459,9 @@
                   <a:schemeClr val="tx1"/>
                 </a:solidFill>
                 <a:effectLst/>
-                <a:latin typeface="Arial" panose="020B0604020202020204" pitchFamily="34" charset="0"/>
+                <a:latin typeface="Times New Roman" panose="02020603050405020304" pitchFamily="18" charset="0"/>
                 <a:ea typeface="Times New Roman" panose="02020603050405020304" pitchFamily="18" charset="0"/>
+                <a:cs typeface="Times New Roman" panose="02020603050405020304" pitchFamily="18" charset="0"/>
               </a:rPr>
               <a:t>Provide&amp;Register</a:t>
             </a:r>
@@ -4470,8 +4474,9 @@
                   <a:schemeClr val="tx1"/>
                 </a:solidFill>
                 <a:effectLst/>
-                <a:latin typeface="Arial" panose="020B0604020202020204" pitchFamily="34" charset="0"/>
+                <a:latin typeface="Times New Roman" panose="02020603050405020304" pitchFamily="18" charset="0"/>
                 <a:ea typeface="Times New Roman" panose="02020603050405020304" pitchFamily="18" charset="0"/>
+                <a:cs typeface="Times New Roman" panose="02020603050405020304" pitchFamily="18" charset="0"/>
               </a:rPr>
             </a:br>
             <a:r>
@@ -4483,8 +4488,9 @@
                   <a:schemeClr val="tx1"/>
                 </a:solidFill>
                 <a:effectLst/>
-                <a:latin typeface="Arial" panose="020B0604020202020204" pitchFamily="34" charset="0"/>
+                <a:latin typeface="Times New Roman" panose="02020603050405020304" pitchFamily="18" charset="0"/>
                 <a:ea typeface="Times New Roman" panose="02020603050405020304" pitchFamily="18" charset="0"/>
+                <a:cs typeface="Times New Roman" panose="02020603050405020304" pitchFamily="18" charset="0"/>
               </a:rPr>
               <a:t>Document Set – b [ITI-41] </a:t>
             </a:r>
@@ -4497,8 +4503,9 @@
                   <a:schemeClr val="tx1"/>
                 </a:solidFill>
                 <a:effectLst/>
-                <a:latin typeface="Arial" panose="020B0604020202020204" pitchFamily="34" charset="0"/>
+                <a:latin typeface="Times New Roman" panose="02020603050405020304" pitchFamily="18" charset="0"/>
                 <a:ea typeface="Times New Roman" panose="02020603050405020304" pitchFamily="18" charset="0"/>
+                <a:cs typeface="Times New Roman" panose="02020603050405020304" pitchFamily="18" charset="0"/>
               </a:rPr>
             </a:br>
             <a:r>
@@ -4510,9 +4517,9 @@
                   <a:schemeClr val="tx1"/>
                 </a:solidFill>
                 <a:effectLst/>
-                <a:latin typeface="Arial" panose="020B0604020202020204" pitchFamily="34" charset="0"/>
+                <a:latin typeface="Times New Roman" panose="02020603050405020304" pitchFamily="18" charset="0"/>
                 <a:ea typeface="Times New Roman" panose="02020603050405020304" pitchFamily="18" charset="0"/>
-                <a:cs typeface="Arial" panose="020B0604020202020204" pitchFamily="34" charset="0"/>
+                <a:cs typeface="Times New Roman" panose="02020603050405020304" pitchFamily="18" charset="0"/>
                 <a:sym typeface="Symbol" pitchFamily="2" charset="2"/>
               </a:rPr>
               <a:t></a:t>
@@ -4599,7 +4606,9 @@
                   <a:schemeClr val="tx1"/>
                 </a:solidFill>
                 <a:effectLst/>
+                <a:latin typeface="Times New Roman" panose="02020603050405020304" pitchFamily="18" charset="0"/>
                 <a:ea typeface="Times New Roman" panose="02020603050405020304" pitchFamily="18" charset="0"/>
+                <a:cs typeface="Times New Roman" panose="02020603050405020304" pitchFamily="18" charset="0"/>
               </a:rPr>
             </a:br>
             <a:r>
@@ -4613,6 +4622,7 @@
                 <a:effectLst/>
                 <a:latin typeface="Times New Roman" panose="02020603050405020304" pitchFamily="18" charset="0"/>
                 <a:ea typeface="Times New Roman" panose="02020603050405020304" pitchFamily="18" charset="0"/>
+                <a:cs typeface="Times New Roman" panose="02020603050405020304" pitchFamily="18" charset="0"/>
                 <a:sym typeface="Symbol" pitchFamily="2" charset="2"/>
               </a:rPr>
               <a:t></a:t>
@@ -4626,7 +4636,9 @@
                   <a:schemeClr val="tx1"/>
                 </a:solidFill>
                 <a:effectLst/>
+                <a:latin typeface="Times New Roman" panose="02020603050405020304" pitchFamily="18" charset="0"/>
                 <a:ea typeface="Times New Roman" panose="02020603050405020304" pitchFamily="18" charset="0"/>
+                <a:cs typeface="Times New Roman" panose="02020603050405020304" pitchFamily="18" charset="0"/>
               </a:rPr>
               <a:t> Register Document Set – b [ITI-42] </a:t>
             </a:r>
@@ -4640,6 +4652,7 @@
               <a:effectLst/>
               <a:latin typeface="Times New Roman" panose="02020603050405020304" pitchFamily="18" charset="0"/>
               <a:ea typeface="Times New Roman" panose="02020603050405020304" pitchFamily="18" charset="0"/>
+              <a:cs typeface="Times New Roman" panose="02020603050405020304" pitchFamily="18" charset="0"/>
               <a:sym typeface="Symbol" pitchFamily="2" charset="2"/>
             </a:endParaRPr>
           </a:p>
@@ -4661,8 +4674,8 @@
         </p:nvSpPr>
         <p:spPr bwMode="auto">
           <a:xfrm>
-            <a:off x="5283200" y="3365500"/>
-            <a:ext cx="1820863" cy="571500"/>
+            <a:off x="4921250" y="3365500"/>
+            <a:ext cx="2182813" cy="571500"/>
           </a:xfrm>
           <a:prstGeom prst="rect">
             <a:avLst/>
@@ -4716,7 +4729,7 @@
               <a:tabLst/>
             </a:pPr>
             <a:br>
-              <a:rPr kumimoji="0" lang="en-US" altLang="en-US" sz="1000" b="0" i="0" u="none" strike="noStrike" cap="none" normalizeH="0" baseline="0">
+              <a:rPr kumimoji="0" lang="en-US" altLang="en-US" sz="1000" b="0" i="0" u="none" strike="noStrike" cap="none" normalizeH="0" baseline="0" dirty="0">
                 <a:ln>
                   <a:noFill/>
                 </a:ln>
@@ -4724,12 +4737,13 @@
                   <a:schemeClr val="tx1"/>
                 </a:solidFill>
                 <a:effectLst/>
-                <a:latin typeface="Arial" panose="020B0604020202020204" pitchFamily="34" charset="0"/>
+                <a:latin typeface="Times New Roman" panose="02020603050405020304" pitchFamily="18" charset="0"/>
                 <a:ea typeface="Times New Roman" panose="02020603050405020304" pitchFamily="18" charset="0"/>
+                <a:cs typeface="Times New Roman" panose="02020603050405020304" pitchFamily="18" charset="0"/>
               </a:rPr>
             </a:br>
             <a:r>
-              <a:rPr kumimoji="0" lang="en-US" altLang="en-US" sz="1000" b="0" i="0" u="none" strike="noStrike" cap="none" normalizeH="0" baseline="0">
+              <a:rPr kumimoji="0" lang="en-US" altLang="en-US" sz="1000" b="0" i="0" u="none" strike="noStrike" cap="none" normalizeH="0" baseline="0" dirty="0">
                 <a:ln>
                   <a:noFill/>
                 </a:ln>
@@ -4737,13 +4751,14 @@
                   <a:schemeClr val="tx1"/>
                 </a:solidFill>
                 <a:effectLst/>
-                <a:latin typeface="Arial" panose="020B0604020202020204" pitchFamily="34" charset="0"/>
+                <a:latin typeface="Times New Roman" panose="02020603050405020304" pitchFamily="18" charset="0"/>
                 <a:ea typeface="Times New Roman" panose="02020603050405020304" pitchFamily="18" charset="0"/>
+                <a:cs typeface="Times New Roman" panose="02020603050405020304" pitchFamily="18" charset="0"/>
               </a:rPr>
               <a:t>Retrieve Document Set [ITI-43]</a:t>
             </a:r>
             <a:br>
-              <a:rPr kumimoji="0" lang="en-US" altLang="en-US" sz="1000" b="0" i="0" u="none" strike="noStrike" cap="none" normalizeH="0" baseline="0">
+              <a:rPr kumimoji="0" lang="en-US" altLang="en-US" sz="1000" b="0" i="0" u="none" strike="noStrike" cap="none" normalizeH="0" baseline="0" dirty="0">
                 <a:ln>
                   <a:noFill/>
                 </a:ln>
@@ -4751,12 +4766,13 @@
                   <a:schemeClr val="tx1"/>
                 </a:solidFill>
                 <a:effectLst/>
-                <a:latin typeface="Arial" panose="020B0604020202020204" pitchFamily="34" charset="0"/>
+                <a:latin typeface="Times New Roman" panose="02020603050405020304" pitchFamily="18" charset="0"/>
                 <a:ea typeface="Times New Roman" panose="02020603050405020304" pitchFamily="18" charset="0"/>
+                <a:cs typeface="Times New Roman" panose="02020603050405020304" pitchFamily="18" charset="0"/>
               </a:rPr>
             </a:br>
             <a:r>
-              <a:rPr kumimoji="0" lang="fr-FR" altLang="en-US" sz="1000" b="0" i="0" u="none" strike="noStrike" cap="none" normalizeH="0" baseline="0">
+              <a:rPr kumimoji="0" lang="fr-FR" altLang="en-US" sz="1000" b="0" i="0" u="none" strike="noStrike" cap="none" normalizeH="0" baseline="0" dirty="0">
                 <a:ln>
                   <a:noFill/>
                 </a:ln>
@@ -4764,9 +4780,9 @@
                   <a:schemeClr val="tx1"/>
                 </a:solidFill>
                 <a:effectLst/>
-                <a:latin typeface="Arial" panose="020B0604020202020204" pitchFamily="34" charset="0"/>
+                <a:latin typeface="Times New Roman" panose="02020603050405020304" pitchFamily="18" charset="0"/>
                 <a:ea typeface="Times New Roman" panose="02020603050405020304" pitchFamily="18" charset="0"/>
-                <a:cs typeface="Arial" panose="020B0604020202020204" pitchFamily="34" charset="0"/>
+                <a:cs typeface="Times New Roman" panose="02020603050405020304" pitchFamily="18" charset="0"/>
                 <a:sym typeface="Symbol" pitchFamily="2" charset="2"/>
               </a:rPr>
               <a:t></a:t>
@@ -4853,7 +4869,9 @@
                   <a:schemeClr val="tx1"/>
                 </a:solidFill>
                 <a:effectLst/>
+                <a:latin typeface="Times New Roman" panose="02020603050405020304" pitchFamily="18" charset="0"/>
                 <a:ea typeface="Times New Roman" panose="02020603050405020304" pitchFamily="18" charset="0"/>
+                <a:cs typeface="Times New Roman" panose="02020603050405020304" pitchFamily="18" charset="0"/>
               </a:rPr>
               <a:t>Registry Stored Query</a:t>
             </a:r>
@@ -4866,7 +4884,9 @@
                   <a:schemeClr val="tx1"/>
                 </a:solidFill>
                 <a:effectLst/>
+                <a:latin typeface="Times New Roman" panose="02020603050405020304" pitchFamily="18" charset="0"/>
                 <a:ea typeface="Times New Roman" panose="02020603050405020304" pitchFamily="18" charset="0"/>
+                <a:cs typeface="Times New Roman" panose="02020603050405020304" pitchFamily="18" charset="0"/>
               </a:rPr>
             </a:br>
             <a:r>
@@ -4878,8 +4898,9 @@
                   <a:schemeClr val="tx1"/>
                 </a:solidFill>
                 <a:effectLst/>
-                <a:latin typeface="Arial" panose="020B0604020202020204" pitchFamily="34" charset="0"/>
+                <a:latin typeface="Times New Roman" panose="02020603050405020304" pitchFamily="18" charset="0"/>
                 <a:ea typeface="Times New Roman" panose="02020603050405020304" pitchFamily="18" charset="0"/>
+                <a:cs typeface="Times New Roman" panose="02020603050405020304" pitchFamily="18" charset="0"/>
               </a:rPr>
               <a:t> [ITI-18] </a:t>
             </a:r>
@@ -4892,9 +4913,9 @@
                   <a:schemeClr val="tx1"/>
                 </a:solidFill>
                 <a:effectLst/>
-                <a:latin typeface="Arial" panose="020B0604020202020204" pitchFamily="34" charset="0"/>
+                <a:latin typeface="Times New Roman" panose="02020603050405020304" pitchFamily="18" charset="0"/>
                 <a:ea typeface="Times New Roman" panose="02020603050405020304" pitchFamily="18" charset="0"/>
-                <a:cs typeface="Arial" panose="020B0604020202020204" pitchFamily="34" charset="0"/>
+                <a:cs typeface="Times New Roman" panose="02020603050405020304" pitchFamily="18" charset="0"/>
                 <a:sym typeface="Symbol" pitchFamily="2" charset="2"/>
               </a:rPr>
               <a:t></a:t>
@@ -4908,7 +4929,9 @@
                   <a:schemeClr val="tx1"/>
                 </a:solidFill>
                 <a:effectLst/>
+                <a:latin typeface="Times New Roman" panose="02020603050405020304" pitchFamily="18" charset="0"/>
                 <a:ea typeface="Times New Roman" panose="02020603050405020304" pitchFamily="18" charset="0"/>
+                <a:cs typeface="Times New Roman" panose="02020603050405020304" pitchFamily="18" charset="0"/>
               </a:rPr>
               <a:t> </a:t>
             </a:r>
@@ -4920,9 +4943,9 @@
                 <a:schemeClr val="tx1"/>
               </a:solidFill>
               <a:effectLst/>
-              <a:latin typeface="Arial" panose="020B0604020202020204" pitchFamily="34" charset="0"/>
+              <a:latin typeface="Times New Roman" panose="02020603050405020304" pitchFamily="18" charset="0"/>
               <a:ea typeface="Times New Roman" panose="02020603050405020304" pitchFamily="18" charset="0"/>
-              <a:cs typeface="Arial" panose="020B0604020202020204" pitchFamily="34" charset="0"/>
+              <a:cs typeface="Times New Roman" panose="02020603050405020304" pitchFamily="18" charset="0"/>
               <a:sym typeface="Symbol" pitchFamily="2" charset="2"/>
             </a:endParaRPr>
           </a:p>
@@ -4975,7 +4998,10 @@
           </a:bodyPr>
           <a:lstStyle/>
           <a:p>
-            <a:endParaRPr lang="en-US"/>
+            <a:endParaRPr lang="en-US">
+              <a:latin typeface="Times New Roman" panose="02020603050405020304" pitchFamily="18" charset="0"/>
+              <a:cs typeface="Times New Roman" panose="02020603050405020304" pitchFamily="18" charset="0"/>
+            </a:endParaRPr>
           </a:p>
         </p:txBody>
       </p:sp>
@@ -5021,7 +5047,10 @@
           </a:bodyPr>
           <a:lstStyle/>
           <a:p>
-            <a:endParaRPr lang="en-US"/>
+            <a:endParaRPr lang="en-US">
+              <a:latin typeface="Times New Roman" panose="02020603050405020304" pitchFamily="18" charset="0"/>
+              <a:cs typeface="Times New Roman" panose="02020603050405020304" pitchFamily="18" charset="0"/>
+            </a:endParaRPr>
           </a:p>
         </p:txBody>
       </p:sp>
@@ -5104,8 +5133,9 @@
                   <a:schemeClr val="tx1"/>
                 </a:solidFill>
                 <a:effectLst/>
-                <a:latin typeface="Arial" panose="020B0604020202020204" pitchFamily="34" charset="0"/>
+                <a:latin typeface="Times New Roman" panose="02020603050405020304" pitchFamily="18" charset="0"/>
                 <a:ea typeface="Times New Roman" panose="02020603050405020304" pitchFamily="18" charset="0"/>
+                <a:cs typeface="Times New Roman" panose="02020603050405020304" pitchFamily="18" charset="0"/>
               </a:rPr>
             </a:br>
             <a:r>
@@ -5117,8 +5147,9 @@
                   <a:schemeClr val="tx1"/>
                 </a:solidFill>
                 <a:effectLst/>
-                <a:latin typeface="Arial" panose="020B0604020202020204" pitchFamily="34" charset="0"/>
+                <a:latin typeface="Times New Roman" panose="02020603050405020304" pitchFamily="18" charset="0"/>
                 <a:ea typeface="Times New Roman" panose="02020603050405020304" pitchFamily="18" charset="0"/>
+                <a:cs typeface="Times New Roman" panose="02020603050405020304" pitchFamily="18" charset="0"/>
               </a:rPr>
               <a:t>Patient Identity Source </a:t>
             </a:r>
@@ -5130,7 +5161,8 @@
                 <a:schemeClr val="tx1"/>
               </a:solidFill>
               <a:effectLst/>
-              <a:latin typeface="Arial" panose="020B0604020202020204" pitchFamily="34" charset="0"/>
+              <a:latin typeface="Times New Roman" panose="02020603050405020304" pitchFamily="18" charset="0"/>
+              <a:cs typeface="Times New Roman" panose="02020603050405020304" pitchFamily="18" charset="0"/>
             </a:endParaRPr>
           </a:p>
         </p:txBody>
@@ -5182,7 +5214,10 @@
           </a:bodyPr>
           <a:lstStyle/>
           <a:p>
-            <a:endParaRPr lang="en-US"/>
+            <a:endParaRPr lang="en-US">
+              <a:latin typeface="Times New Roman" panose="02020603050405020304" pitchFamily="18" charset="0"/>
+              <a:cs typeface="Times New Roman" panose="02020603050405020304" pitchFamily="18" charset="0"/>
+            </a:endParaRPr>
           </a:p>
         </p:txBody>
       </p:sp>
@@ -5421,8 +5456,9 @@
                   <a:schemeClr val="tx1"/>
                 </a:solidFill>
                 <a:effectLst/>
-                <a:latin typeface="Arial" panose="020B0604020202020204" pitchFamily="34" charset="0"/>
+                <a:latin typeface="Times New Roman" panose="02020603050405020304" pitchFamily="18" charset="0"/>
                 <a:ea typeface="Times New Roman" panose="02020603050405020304" pitchFamily="18" charset="0"/>
+                <a:cs typeface="Times New Roman" panose="02020603050405020304" pitchFamily="18" charset="0"/>
               </a:rPr>
             </a:br>
             <a:r>
@@ -5434,8 +5470,9 @@
                   <a:schemeClr val="tx1"/>
                 </a:solidFill>
                 <a:effectLst/>
-                <a:latin typeface="Arial" panose="020B0604020202020204" pitchFamily="34" charset="0"/>
+                <a:latin typeface="Times New Roman" panose="02020603050405020304" pitchFamily="18" charset="0"/>
                 <a:ea typeface="Times New Roman" panose="02020603050405020304" pitchFamily="18" charset="0"/>
+                <a:cs typeface="Times New Roman" panose="02020603050405020304" pitchFamily="18" charset="0"/>
               </a:rPr>
               <a:t>Patient Identity Feed [ITI-8]</a:t>
             </a:r>
@@ -5447,7 +5484,8 @@
                 <a:schemeClr val="tx1"/>
               </a:solidFill>
               <a:effectLst/>
-              <a:latin typeface="Arial" panose="020B0604020202020204" pitchFamily="34" charset="0"/>
+              <a:latin typeface="Times New Roman" panose="02020603050405020304" pitchFamily="18" charset="0"/>
+              <a:cs typeface="Times New Roman" panose="02020603050405020304" pitchFamily="18" charset="0"/>
             </a:endParaRPr>
           </a:p>
           <a:p>
@@ -5478,8 +5516,9 @@
                   <a:schemeClr val="tx1"/>
                 </a:solidFill>
                 <a:effectLst/>
-                <a:latin typeface="Arial" panose="020B0604020202020204" pitchFamily="34" charset="0"/>
+                <a:latin typeface="Times New Roman" panose="02020603050405020304" pitchFamily="18" charset="0"/>
                 <a:ea typeface="Times New Roman" panose="02020603050405020304" pitchFamily="18" charset="0"/>
+                <a:cs typeface="Times New Roman" panose="02020603050405020304" pitchFamily="18" charset="0"/>
               </a:rPr>
               <a:t>Patient Identity Feed HL7v3 [ITI-44] </a:t>
             </a:r>
@@ -5494,6 +5533,7 @@
                 <a:effectLst/>
                 <a:latin typeface="Times New Roman" panose="02020603050405020304" pitchFamily="18" charset="0"/>
                 <a:ea typeface="Times New Roman" panose="02020603050405020304" pitchFamily="18" charset="0"/>
+                <a:cs typeface="Times New Roman" panose="02020603050405020304" pitchFamily="18" charset="0"/>
                 <a:sym typeface="Symbol" pitchFamily="2" charset="2"/>
               </a:rPr>
               <a:t></a:t>
@@ -5575,7 +5615,9 @@
                   <a:schemeClr val="tx1"/>
                 </a:solidFill>
                 <a:effectLst/>
+                <a:latin typeface="Times New Roman" panose="02020603050405020304" pitchFamily="18" charset="0"/>
                 <a:ea typeface="Times New Roman" panose="02020603050405020304" pitchFamily="18" charset="0"/>
+                <a:cs typeface="Times New Roman" panose="02020603050405020304" pitchFamily="18" charset="0"/>
               </a:rPr>
               <a:t>Integrated Document Source/Repository</a:t>
             </a:r>
@@ -5587,7 +5629,8 @@
                 <a:schemeClr val="tx1"/>
               </a:solidFill>
               <a:effectLst/>
-              <a:latin typeface="Arial" panose="020B0604020202020204" pitchFamily="34" charset="0"/>
+              <a:latin typeface="Times New Roman" panose="02020603050405020304" pitchFamily="18" charset="0"/>
+              <a:cs typeface="Times New Roman" panose="02020603050405020304" pitchFamily="18" charset="0"/>
             </a:endParaRPr>
           </a:p>
         </p:txBody>
@@ -5639,7 +5682,10 @@
           </a:bodyPr>
           <a:lstStyle/>
           <a:p>
-            <a:endParaRPr lang="en-US"/>
+            <a:endParaRPr lang="en-US">
+              <a:latin typeface="Times New Roman" panose="02020603050405020304" pitchFamily="18" charset="0"/>
+              <a:cs typeface="Times New Roman" panose="02020603050405020304" pitchFamily="18" charset="0"/>
+            </a:endParaRPr>
           </a:p>
         </p:txBody>
       </p:sp>
@@ -5685,7 +5731,10 @@
           </a:bodyPr>
           <a:lstStyle/>
           <a:p>
-            <a:endParaRPr lang="en-US"/>
+            <a:endParaRPr lang="en-US">
+              <a:latin typeface="Times New Roman" panose="02020603050405020304" pitchFamily="18" charset="0"/>
+              <a:cs typeface="Times New Roman" panose="02020603050405020304" pitchFamily="18" charset="0"/>
+            </a:endParaRPr>
           </a:p>
         </p:txBody>
       </p:sp>
@@ -5768,8 +5817,9 @@
                   <a:schemeClr val="tx1"/>
                 </a:solidFill>
                 <a:effectLst/>
-                <a:latin typeface="Arial" panose="020B0604020202020204" pitchFamily="34" charset="0"/>
+                <a:latin typeface="Times New Roman" panose="02020603050405020304" pitchFamily="18" charset="0"/>
                 <a:ea typeface="Times New Roman" panose="02020603050405020304" pitchFamily="18" charset="0"/>
+                <a:cs typeface="Times New Roman" panose="02020603050405020304" pitchFamily="18" charset="0"/>
               </a:rPr>
             </a:br>
             <a:r>
@@ -5781,8 +5831,9 @@
                   <a:schemeClr val="tx1"/>
                 </a:solidFill>
                 <a:effectLst/>
-                <a:latin typeface="Arial" panose="020B0604020202020204" pitchFamily="34" charset="0"/>
+                <a:latin typeface="Times New Roman" panose="02020603050405020304" pitchFamily="18" charset="0"/>
                 <a:ea typeface="Times New Roman" panose="02020603050405020304" pitchFamily="18" charset="0"/>
+                <a:cs typeface="Times New Roman" panose="02020603050405020304" pitchFamily="18" charset="0"/>
               </a:rPr>
               <a:t>On-Demand Document Source</a:t>
             </a:r>
@@ -5794,7 +5845,8 @@
                 <a:schemeClr val="tx1"/>
               </a:solidFill>
               <a:effectLst/>
-              <a:latin typeface="Arial" panose="020B0604020202020204" pitchFamily="34" charset="0"/>
+              <a:latin typeface="Times New Roman" panose="02020603050405020304" pitchFamily="18" charset="0"/>
+              <a:cs typeface="Times New Roman" panose="02020603050405020304" pitchFamily="18" charset="0"/>
             </a:endParaRPr>
           </a:p>
         </p:txBody>
@@ -5846,7 +5898,10 @@
           </a:bodyPr>
           <a:lstStyle/>
           <a:p>
-            <a:endParaRPr lang="en-US"/>
+            <a:endParaRPr lang="en-US">
+              <a:latin typeface="Times New Roman" panose="02020603050405020304" pitchFamily="18" charset="0"/>
+              <a:cs typeface="Times New Roman" panose="02020603050405020304" pitchFamily="18" charset="0"/>
+            </a:endParaRPr>
           </a:p>
         </p:txBody>
       </p:sp>
@@ -5897,7 +5952,10 @@
           </a:bodyPr>
           <a:lstStyle/>
           <a:p>
-            <a:endParaRPr lang="en-US"/>
+            <a:endParaRPr lang="en-US">
+              <a:latin typeface="Times New Roman" panose="02020603050405020304" pitchFamily="18" charset="0"/>
+              <a:cs typeface="Times New Roman" panose="02020603050405020304" pitchFamily="18" charset="0"/>
+            </a:endParaRPr>
           </a:p>
         </p:txBody>
       </p:sp>
@@ -5972,7 +6030,7 @@
               <a:tabLst/>
             </a:pPr>
             <a:r>
-              <a:rPr kumimoji="0" lang="fr-FR" altLang="en-US" sz="1000" b="0" i="0" u="none" strike="noStrike" cap="none" normalizeH="0" baseline="0">
+              <a:rPr kumimoji="0" lang="fr-FR" altLang="en-US" sz="1000" b="0" i="0" u="none" strike="noStrike" cap="none" normalizeH="0" baseline="0" dirty="0" err="1">
                 <a:ln>
                   <a:noFill/>
                 </a:ln>
@@ -5980,13 +6038,14 @@
                   <a:schemeClr val="tx1"/>
                 </a:solidFill>
                 <a:effectLst/>
-                <a:latin typeface="Arial" panose="020B0604020202020204" pitchFamily="34" charset="0"/>
+                <a:latin typeface="Times New Roman" panose="02020603050405020304" pitchFamily="18" charset="0"/>
                 <a:ea typeface="Times New Roman" panose="02020603050405020304" pitchFamily="18" charset="0"/>
+                <a:cs typeface="Times New Roman" panose="02020603050405020304" pitchFamily="18" charset="0"/>
               </a:rPr>
-              <a:t>Register On-Demand Document Entry [ITI-61] </a:t>
-            </a:r>
-            <a:r>
-              <a:rPr kumimoji="0" lang="fr-FR" altLang="en-US" sz="1000" b="0" i="0" u="none" strike="noStrike" cap="none" normalizeH="0" baseline="0">
+              <a:t>Register</a:t>
+            </a:r>
+            <a:r>
+              <a:rPr kumimoji="0" lang="fr-FR" altLang="en-US" sz="1000" b="0" i="0" u="none" strike="noStrike" cap="none" normalizeH="0" baseline="0" dirty="0">
                 <a:ln>
                   <a:noFill/>
                 </a:ln>
@@ -5994,15 +6053,60 @@
                   <a:schemeClr val="tx1"/>
                 </a:solidFill>
                 <a:effectLst/>
-                <a:latin typeface="Arial" panose="020B0604020202020204" pitchFamily="34" charset="0"/>
+                <a:latin typeface="Times New Roman" panose="02020603050405020304" pitchFamily="18" charset="0"/>
                 <a:ea typeface="Times New Roman" panose="02020603050405020304" pitchFamily="18" charset="0"/>
-                <a:cs typeface="Arial" panose="020B0604020202020204" pitchFamily="34" charset="0"/>
+                <a:cs typeface="Times New Roman" panose="02020603050405020304" pitchFamily="18" charset="0"/>
+              </a:rPr>
+              <a:t> On-</a:t>
+            </a:r>
+            <a:r>
+              <a:rPr kumimoji="0" lang="fr-FR" altLang="en-US" sz="1000" b="0" i="0" u="none" strike="noStrike" cap="none" normalizeH="0" baseline="0" dirty="0" err="1">
+                <a:ln>
+                  <a:noFill/>
+                </a:ln>
+                <a:solidFill>
+                  <a:schemeClr val="tx1"/>
+                </a:solidFill>
+                <a:effectLst/>
+                <a:latin typeface="Times New Roman" panose="02020603050405020304" pitchFamily="18" charset="0"/>
+                <a:ea typeface="Times New Roman" panose="02020603050405020304" pitchFamily="18" charset="0"/>
+                <a:cs typeface="Times New Roman" panose="02020603050405020304" pitchFamily="18" charset="0"/>
+              </a:rPr>
+              <a:t>Demand</a:t>
+            </a:r>
+            <a:r>
+              <a:rPr kumimoji="0" lang="fr-FR" altLang="en-US" sz="1000" b="0" i="0" u="none" strike="noStrike" cap="none" normalizeH="0" baseline="0" dirty="0">
+                <a:ln>
+                  <a:noFill/>
+                </a:ln>
+                <a:solidFill>
+                  <a:schemeClr val="tx1"/>
+                </a:solidFill>
+                <a:effectLst/>
+                <a:latin typeface="Times New Roman" panose="02020603050405020304" pitchFamily="18" charset="0"/>
+                <a:ea typeface="Times New Roman" panose="02020603050405020304" pitchFamily="18" charset="0"/>
+                <a:cs typeface="Times New Roman" panose="02020603050405020304" pitchFamily="18" charset="0"/>
+              </a:rPr>
+              <a:t> Document Entry [ITI-61] </a:t>
+            </a:r>
+            <a:r>
+              <a:rPr kumimoji="0" lang="fr-FR" altLang="en-US" sz="1000" b="0" i="0" u="none" strike="noStrike" cap="none" normalizeH="0" baseline="0" dirty="0">
+                <a:ln>
+                  <a:noFill/>
+                </a:ln>
+                <a:solidFill>
+                  <a:schemeClr val="tx1"/>
+                </a:solidFill>
+                <a:effectLst/>
+                <a:latin typeface="Times New Roman" panose="02020603050405020304" pitchFamily="18" charset="0"/>
+                <a:ea typeface="Times New Roman" panose="02020603050405020304" pitchFamily="18" charset="0"/>
+                <a:cs typeface="Times New Roman" panose="02020603050405020304" pitchFamily="18" charset="0"/>
                 <a:sym typeface="Symbol" pitchFamily="2" charset="2"/>
               </a:rPr>
               <a:t></a:t>
             </a:r>
             <a:r>
-              <a:rPr kumimoji="0" lang="fr-FR" altLang="en-US" sz="1000" b="0" i="0" u="none" strike="noStrike" cap="none" normalizeH="0" baseline="0">
+              <a:rPr kumimoji="0" lang="fr-FR" altLang="en-US" sz="1000" b="0" i="0" u="none" strike="noStrike" cap="none" normalizeH="0" baseline="0" dirty="0">
                 <a:ln>
                   <a:noFill/>
                 </a:ln>
@@ -6010,11 +6114,13 @@
                   <a:schemeClr val="tx1"/>
                 </a:solidFill>
                 <a:effectLst/>
+                <a:latin typeface="Times New Roman" panose="02020603050405020304" pitchFamily="18" charset="0"/>
                 <a:ea typeface="Times New Roman" panose="02020603050405020304" pitchFamily="18" charset="0"/>
+                <a:cs typeface="Times New Roman" panose="02020603050405020304" pitchFamily="18" charset="0"/>
               </a:rPr>
               <a:t> </a:t>
             </a:r>
-            <a:endParaRPr kumimoji="0" lang="fr-FR" altLang="en-US" sz="1000" b="0" i="0" u="none" strike="noStrike" cap="none" normalizeH="0" baseline="0">
+            <a:endParaRPr kumimoji="0" lang="fr-FR" altLang="en-US" sz="1000" b="0" i="0" u="none" strike="noStrike" cap="none" normalizeH="0" baseline="0" dirty="0">
               <a:ln>
                 <a:noFill/>
               </a:ln>
@@ -6022,9 +6128,9 @@
                 <a:schemeClr val="tx1"/>
               </a:solidFill>
               <a:effectLst/>
-              <a:latin typeface="Arial" panose="020B0604020202020204" pitchFamily="34" charset="0"/>
+              <a:latin typeface="Times New Roman" panose="02020603050405020304" pitchFamily="18" charset="0"/>
               <a:ea typeface="Times New Roman" panose="02020603050405020304" pitchFamily="18" charset="0"/>
-              <a:cs typeface="Arial" panose="020B0604020202020204" pitchFamily="34" charset="0"/>
+              <a:cs typeface="Times New Roman" panose="02020603050405020304" pitchFamily="18" charset="0"/>
               <a:sym typeface="Symbol" pitchFamily="2" charset="2"/>
             </a:endParaRPr>
           </a:p>
@@ -6109,8 +6215,9 @@
                   <a:schemeClr val="tx1"/>
                 </a:solidFill>
                 <a:effectLst/>
-                <a:latin typeface="Arial" panose="020B0604020202020204" pitchFamily="34" charset="0"/>
+                <a:latin typeface="Times New Roman" panose="02020603050405020304" pitchFamily="18" charset="0"/>
                 <a:ea typeface="Times New Roman" panose="02020603050405020304" pitchFamily="18" charset="0"/>
+                <a:cs typeface="Times New Roman" panose="02020603050405020304" pitchFamily="18" charset="0"/>
               </a:rPr>
               <a:t>Retrieve Document Set [ITI-43]</a:t>
             </a:r>
@@ -6123,8 +6230,9 @@
                   <a:schemeClr val="tx1"/>
                 </a:solidFill>
                 <a:effectLst/>
-                <a:latin typeface="Arial" panose="020B0604020202020204" pitchFamily="34" charset="0"/>
+                <a:latin typeface="Times New Roman" panose="02020603050405020304" pitchFamily="18" charset="0"/>
                 <a:ea typeface="Times New Roman" panose="02020603050405020304" pitchFamily="18" charset="0"/>
+                <a:cs typeface="Times New Roman" panose="02020603050405020304" pitchFamily="18" charset="0"/>
               </a:rPr>
               <a:t> </a:t>
             </a:r>
@@ -6139,6 +6247,7 @@
                 <a:effectLst/>
                 <a:latin typeface="Times New Roman" panose="02020603050405020304" pitchFamily="18" charset="0"/>
                 <a:ea typeface="Times New Roman" panose="02020603050405020304" pitchFamily="18" charset="0"/>
+                <a:cs typeface="Times New Roman" panose="02020603050405020304" pitchFamily="18" charset="0"/>
                 <a:sym typeface="Symbol" pitchFamily="2" charset="2"/>
               </a:rPr>
               <a:t></a:t>
@@ -6193,7 +6302,10 @@
           </a:bodyPr>
           <a:lstStyle/>
           <a:p>
-            <a:endParaRPr lang="en-US"/>
+            <a:endParaRPr lang="en-US">
+              <a:latin typeface="Times New Roman" panose="02020603050405020304" pitchFamily="18" charset="0"/>
+              <a:cs typeface="Times New Roman" panose="02020603050405020304" pitchFamily="18" charset="0"/>
+            </a:endParaRPr>
           </a:p>
         </p:txBody>
       </p:sp>
@@ -6244,7 +6356,10 @@
           </a:bodyPr>
           <a:lstStyle/>
           <a:p>
-            <a:endParaRPr lang="en-US"/>
+            <a:endParaRPr lang="en-US">
+              <a:latin typeface="Times New Roman" panose="02020603050405020304" pitchFamily="18" charset="0"/>
+              <a:cs typeface="Times New Roman" panose="02020603050405020304" pitchFamily="18" charset="0"/>
+            </a:endParaRPr>
           </a:p>
         </p:txBody>
       </p:sp>

</xml_diff>